<commit_message>
final fucking fuck GAD DAMN!
</commit_message>
<xml_diff>
--- a/презентация.pptx
+++ b/презентация.pptx
@@ -224,7 +224,7 @@
           <a:p>
             <a:fld id="{EE4BEA0C-B298-4F3F-8EAA-78E653AF7C43}" type="datetimeFigureOut">
               <a:rPr lang="ru-RU" smtClean="0"/>
-              <a:t>05.06.2022</a:t>
+              <a:t>06.06.2022</a:t>
             </a:fld>
             <a:endParaRPr lang="ru-RU"/>
           </a:p>
@@ -389,7 +389,7 @@
           <a:p>
             <a:fld id="{56F03E67-5427-4260-B62A-5770CE0A55F7}" type="datetimeFigureOut">
               <a:rPr lang="ru-RU" smtClean="0"/>
-              <a:t>05.06.2022</a:t>
+              <a:t>06.06.2022</a:t>
             </a:fld>
             <a:endParaRPr lang="ru-RU"/>
           </a:p>
@@ -941,7 +941,7 @@
           <a:p>
             <a:fld id="{61BBDE8E-1A21-4D39-9CDA-17B1B51844FA}" type="datetimeFigureOut">
               <a:rPr lang="ru-RU" smtClean="0"/>
-              <a:t>05.06.2022</a:t>
+              <a:t>06.06.2022</a:t>
             </a:fld>
             <a:endParaRPr lang="ru-RU"/>
           </a:p>
@@ -1241,7 +1241,7 @@
           <a:p>
             <a:fld id="{61BBDE8E-1A21-4D39-9CDA-17B1B51844FA}" type="datetimeFigureOut">
               <a:rPr lang="ru-RU" smtClean="0"/>
-              <a:t>05.06.2022</a:t>
+              <a:t>06.06.2022</a:t>
             </a:fld>
             <a:endParaRPr lang="ru-RU"/>
           </a:p>
@@ -1501,7 +1501,7 @@
           <a:p>
             <a:fld id="{61BBDE8E-1A21-4D39-9CDA-17B1B51844FA}" type="datetimeFigureOut">
               <a:rPr lang="ru-RU" smtClean="0"/>
-              <a:t>05.06.2022</a:t>
+              <a:t>06.06.2022</a:t>
             </a:fld>
             <a:endParaRPr lang="ru-RU"/>
           </a:p>
@@ -2182,7 +2182,7 @@
           <a:p>
             <a:fld id="{61BBDE8E-1A21-4D39-9CDA-17B1B51844FA}" type="datetimeFigureOut">
               <a:rPr lang="ru-RU" smtClean="0"/>
-              <a:t>05.06.2022</a:t>
+              <a:t>06.06.2022</a:t>
             </a:fld>
             <a:endParaRPr lang="ru-RU"/>
           </a:p>
@@ -4516,7 +4516,7 @@
           <a:p>
             <a:fld id="{61BBDE8E-1A21-4D39-9CDA-17B1B51844FA}" type="datetimeFigureOut">
               <a:rPr lang="ru-RU" smtClean="0"/>
-              <a:t>05.06.2022</a:t>
+              <a:t>06.06.2022</a:t>
             </a:fld>
             <a:endParaRPr lang="ru-RU"/>
           </a:p>
@@ -4955,7 +4955,7 @@
           <a:lstStyle/>
           <a:p>
             <a:r>
-              <a:rPr lang="ru-RU" sz="2400" b="0" dirty="0">
+              <a:rPr lang="ru-RU" sz="2400" b="0" dirty="0" smtClean="0">
                 <a:solidFill>
                   <a:schemeClr val="accent1">
                     <a:lumMod val="50000"/>
@@ -4967,7 +4967,7 @@
               <a:t>Разработка гибридного </a:t>
             </a:r>
             <a:r>
-              <a:rPr lang="ru-RU" sz="2400" b="0" dirty="0" err="1">
+              <a:rPr lang="ru-RU" sz="2400" b="0" dirty="0" err="1" smtClean="0">
                 <a:solidFill>
                   <a:schemeClr val="accent1">
                     <a:lumMod val="50000"/>
@@ -4979,7 +4979,7 @@
               <a:t>фреймворка</a:t>
             </a:r>
             <a:r>
-              <a:rPr lang="ru-RU" sz="2400" b="0" dirty="0">
+              <a:rPr lang="ru-RU" sz="2400" b="0" dirty="0" smtClean="0">
                 <a:solidFill>
                   <a:schemeClr val="accent1">
                     <a:lumMod val="50000"/>
@@ -4988,7 +4988,7 @@
                 <a:latin typeface="Montserrat" pitchFamily="2" charset="0"/>
                 <a:cs typeface="Arial" panose="020B0604020202020204" pitchFamily="34" charset="0"/>
               </a:rPr>
-              <a:t> для автоматизации тестирования в крупных компаниях</a:t>
+              <a:t> для автоматизации тестирования приложений</a:t>
             </a:r>
             <a:endParaRPr lang="ru-RU" sz="2400" b="0" dirty="0">
               <a:latin typeface="Montserrat" pitchFamily="2" charset="0"/>
@@ -5171,19 +5171,7 @@
                 <a:latin typeface="Montserrat" pitchFamily="2" charset="0"/>
                 <a:cs typeface="Arial" panose="020B0604020202020204" pitchFamily="34" charset="0"/>
               </a:rPr>
-              <a:t> Елена Яковлевна, </a:t>
-            </a:r>
-            <a:r>
-              <a:rPr lang="ru-RU" sz="1400" dirty="0" smtClean="0">
-                <a:solidFill>
-                  <a:schemeClr val="accent1">
-                    <a:lumMod val="50000"/>
-                  </a:schemeClr>
-                </a:solidFill>
-                <a:latin typeface="Montserrat" pitchFamily="2" charset="0"/>
-                <a:cs typeface="Arial" panose="020B0604020202020204" pitchFamily="34" charset="0"/>
-              </a:rPr>
-              <a:t>доцент, к.т.н.</a:t>
+              <a:t> Елена Яковлевна, доцент, к.т.н.</a:t>
             </a:r>
             <a:endParaRPr lang="ru-RU" sz="1400" dirty="0">
               <a:solidFill>
@@ -5359,7 +5347,7 @@
           <a:lstStyle/>
           <a:p>
             <a:r>
-              <a:rPr lang="ru-RU" sz="1000" dirty="0">
+              <a:rPr lang="ru-RU" sz="1000" dirty="0" smtClean="0">
                 <a:solidFill>
                   <a:schemeClr val="bg1"/>
                 </a:solidFill>
@@ -5368,7 +5356,7 @@
               <a:t>Разработка гибридного </a:t>
             </a:r>
             <a:r>
-              <a:rPr lang="ru-RU" sz="1000" dirty="0" err="1">
+              <a:rPr lang="ru-RU" sz="1000" dirty="0" err="1" smtClean="0">
                 <a:solidFill>
                   <a:schemeClr val="bg1"/>
                 </a:solidFill>
@@ -5377,14 +5365,20 @@
               <a:t>фреймворка</a:t>
             </a:r>
             <a:r>
-              <a:rPr lang="ru-RU" sz="1000" dirty="0">
+              <a:rPr lang="ru-RU" sz="1000" dirty="0" smtClean="0">
                 <a:solidFill>
                   <a:schemeClr val="bg1"/>
                 </a:solidFill>
                 <a:latin typeface="Montserrat" pitchFamily="2" charset="0"/>
               </a:rPr>
-              <a:t> для автоматизации тестирования в крупных компаниях</a:t>
-            </a:r>
+              <a:t> для автоматизации тестирования приложений</a:t>
+            </a:r>
+            <a:endParaRPr lang="ru-RU" sz="1000" dirty="0">
+              <a:solidFill>
+                <a:schemeClr val="bg1"/>
+              </a:solidFill>
+              <a:latin typeface="Montserrat" pitchFamily="2" charset="0"/>
+            </a:endParaRPr>
           </a:p>
         </p:txBody>
       </p:sp>
@@ -5723,7 +5717,7 @@
           <a:lstStyle/>
           <a:p>
             <a:r>
-              <a:rPr lang="ru-RU" sz="1000" dirty="0">
+              <a:rPr lang="ru-RU" sz="1000" dirty="0" smtClean="0">
                 <a:solidFill>
                   <a:schemeClr val="bg1"/>
                 </a:solidFill>
@@ -5732,7 +5726,7 @@
               <a:t>Разработка гибридного </a:t>
             </a:r>
             <a:r>
-              <a:rPr lang="ru-RU" sz="1000" dirty="0" err="1">
+              <a:rPr lang="ru-RU" sz="1000" dirty="0" err="1" smtClean="0">
                 <a:solidFill>
                   <a:schemeClr val="bg1"/>
                 </a:solidFill>
@@ -5741,14 +5735,20 @@
               <a:t>фреймворка</a:t>
             </a:r>
             <a:r>
-              <a:rPr lang="ru-RU" sz="1000" dirty="0">
+              <a:rPr lang="ru-RU" sz="1000" dirty="0" smtClean="0">
                 <a:solidFill>
                   <a:schemeClr val="bg1"/>
                 </a:solidFill>
                 <a:latin typeface="Montserrat" pitchFamily="2" charset="0"/>
               </a:rPr>
-              <a:t> для автоматизации тестирования в крупных компаниях</a:t>
-            </a:r>
+              <a:t> для автоматизации тестирования приложений</a:t>
+            </a:r>
+            <a:endParaRPr lang="ru-RU" sz="1000" dirty="0">
+              <a:solidFill>
+                <a:schemeClr val="bg1"/>
+              </a:solidFill>
+              <a:latin typeface="Montserrat" pitchFamily="2" charset="0"/>
+            </a:endParaRPr>
           </a:p>
         </p:txBody>
       </p:sp>
@@ -6087,7 +6087,7 @@
           <a:lstStyle/>
           <a:p>
             <a:r>
-              <a:rPr lang="ru-RU" sz="1000" dirty="0">
+              <a:rPr lang="ru-RU" sz="1000" dirty="0" smtClean="0">
                 <a:solidFill>
                   <a:schemeClr val="bg1"/>
                 </a:solidFill>
@@ -6096,7 +6096,7 @@
               <a:t>Разработка гибридного </a:t>
             </a:r>
             <a:r>
-              <a:rPr lang="ru-RU" sz="1000" dirty="0" err="1">
+              <a:rPr lang="ru-RU" sz="1000" dirty="0" err="1" smtClean="0">
                 <a:solidFill>
                   <a:schemeClr val="bg1"/>
                 </a:solidFill>
@@ -6105,14 +6105,20 @@
               <a:t>фреймворка</a:t>
             </a:r>
             <a:r>
-              <a:rPr lang="ru-RU" sz="1000" dirty="0">
+              <a:rPr lang="ru-RU" sz="1000" dirty="0" smtClean="0">
                 <a:solidFill>
                   <a:schemeClr val="bg1"/>
                 </a:solidFill>
                 <a:latin typeface="Montserrat" pitchFamily="2" charset="0"/>
               </a:rPr>
-              <a:t> для автоматизации тестирования в крупных компаниях</a:t>
-            </a:r>
+              <a:t> для автоматизации тестирования приложений</a:t>
+            </a:r>
+            <a:endParaRPr lang="ru-RU" sz="1000" dirty="0">
+              <a:solidFill>
+                <a:schemeClr val="bg1"/>
+              </a:solidFill>
+              <a:latin typeface="Montserrat" pitchFamily="2" charset="0"/>
+            </a:endParaRPr>
           </a:p>
         </p:txBody>
       </p:sp>
@@ -6474,7 +6480,7 @@
           <a:lstStyle/>
           <a:p>
             <a:r>
-              <a:rPr lang="ru-RU" sz="1000" dirty="0">
+              <a:rPr lang="ru-RU" sz="1000" dirty="0" smtClean="0">
                 <a:solidFill>
                   <a:schemeClr val="bg1"/>
                 </a:solidFill>
@@ -6483,7 +6489,7 @@
               <a:t>Разработка гибридного </a:t>
             </a:r>
             <a:r>
-              <a:rPr lang="ru-RU" sz="1000" dirty="0" err="1">
+              <a:rPr lang="ru-RU" sz="1000" dirty="0" err="1" smtClean="0">
                 <a:solidFill>
                   <a:schemeClr val="bg1"/>
                 </a:solidFill>
@@ -6492,14 +6498,20 @@
               <a:t>фреймворка</a:t>
             </a:r>
             <a:r>
-              <a:rPr lang="ru-RU" sz="1000" dirty="0">
+              <a:rPr lang="ru-RU" sz="1000" dirty="0" smtClean="0">
                 <a:solidFill>
                   <a:schemeClr val="bg1"/>
                 </a:solidFill>
                 <a:latin typeface="Montserrat" pitchFamily="2" charset="0"/>
               </a:rPr>
-              <a:t> для автоматизации тестирования в крупных компаниях</a:t>
-            </a:r>
+              <a:t> для автоматизации тестирования приложений</a:t>
+            </a:r>
+            <a:endParaRPr lang="ru-RU" sz="1000" dirty="0">
+              <a:solidFill>
+                <a:schemeClr val="bg1"/>
+              </a:solidFill>
+              <a:latin typeface="Montserrat" pitchFamily="2" charset="0"/>
+            </a:endParaRPr>
           </a:p>
         </p:txBody>
       </p:sp>
@@ -12982,7 +12994,7 @@
           <a:lstStyle/>
           <a:p>
             <a:r>
-              <a:rPr lang="ru-RU" sz="1000" dirty="0">
+              <a:rPr lang="ru-RU" sz="1000" dirty="0" smtClean="0">
                 <a:solidFill>
                   <a:schemeClr val="bg1"/>
                 </a:solidFill>
@@ -12991,7 +13003,7 @@
               <a:t>Разработка гибридного </a:t>
             </a:r>
             <a:r>
-              <a:rPr lang="ru-RU" sz="1000" dirty="0" err="1">
+              <a:rPr lang="ru-RU" sz="1000" dirty="0" err="1" smtClean="0">
                 <a:solidFill>
                   <a:schemeClr val="bg1"/>
                 </a:solidFill>
@@ -13000,14 +13012,20 @@
               <a:t>фреймворка</a:t>
             </a:r>
             <a:r>
-              <a:rPr lang="ru-RU" sz="1000" dirty="0">
+              <a:rPr lang="ru-RU" sz="1000" dirty="0" smtClean="0">
                 <a:solidFill>
                   <a:schemeClr val="bg1"/>
                 </a:solidFill>
                 <a:latin typeface="Montserrat" pitchFamily="2" charset="0"/>
               </a:rPr>
-              <a:t> для автоматизации тестирования в крупных компаниях</a:t>
-            </a:r>
+              <a:t> для автоматизации тестирования приложений</a:t>
+            </a:r>
+            <a:endParaRPr lang="ru-RU" sz="1000" dirty="0">
+              <a:solidFill>
+                <a:schemeClr val="bg1"/>
+              </a:solidFill>
+              <a:latin typeface="Montserrat" pitchFamily="2" charset="0"/>
+            </a:endParaRPr>
           </a:p>
         </p:txBody>
       </p:sp>
@@ -13330,7 +13348,7 @@
           <a:lstStyle/>
           <a:p>
             <a:r>
-              <a:rPr lang="ru-RU" sz="1000" dirty="0">
+              <a:rPr lang="ru-RU" sz="1000" dirty="0" smtClean="0">
                 <a:solidFill>
                   <a:schemeClr val="bg1"/>
                 </a:solidFill>
@@ -13339,7 +13357,7 @@
               <a:t>Разработка гибридного </a:t>
             </a:r>
             <a:r>
-              <a:rPr lang="ru-RU" sz="1000" dirty="0" err="1">
+              <a:rPr lang="ru-RU" sz="1000" dirty="0" err="1" smtClean="0">
                 <a:solidFill>
                   <a:schemeClr val="bg1"/>
                 </a:solidFill>
@@ -13348,14 +13366,20 @@
               <a:t>фреймворка</a:t>
             </a:r>
             <a:r>
-              <a:rPr lang="ru-RU" sz="1000" dirty="0">
+              <a:rPr lang="ru-RU" sz="1000" dirty="0" smtClean="0">
                 <a:solidFill>
                   <a:schemeClr val="bg1"/>
                 </a:solidFill>
                 <a:latin typeface="Montserrat" pitchFamily="2" charset="0"/>
               </a:rPr>
-              <a:t> для автоматизации тестирования в крупных компаниях</a:t>
-            </a:r>
+              <a:t> для автоматизации тестирования приложений</a:t>
+            </a:r>
+            <a:endParaRPr lang="ru-RU" sz="1000" dirty="0">
+              <a:solidFill>
+                <a:schemeClr val="bg1"/>
+              </a:solidFill>
+              <a:latin typeface="Montserrat" pitchFamily="2" charset="0"/>
+            </a:endParaRPr>
           </a:p>
         </p:txBody>
       </p:sp>
@@ -13797,14 +13821,7 @@
                 <a:latin typeface="Arial" panose="020B0604020202020204" pitchFamily="34" charset="0"/>
                 <a:cs typeface="Arial" panose="020B0604020202020204" pitchFamily="34" charset="0"/>
               </a:rPr>
-              <a:t>недоступность </a:t>
-            </a:r>
-            <a:r>
-              <a:rPr lang="ru-RU" dirty="0" smtClean="0">
-                <a:latin typeface="Arial" panose="020B0604020202020204" pitchFamily="34" charset="0"/>
-                <a:cs typeface="Arial" panose="020B0604020202020204" pitchFamily="34" charset="0"/>
-              </a:rPr>
-              <a:t>для специалистов по ручному тестированию</a:t>
+              <a:t>недоступность для специалистов по ручному тестированию</a:t>
             </a:r>
             <a:endParaRPr lang="ru-RU" dirty="0">
               <a:latin typeface="Arial" panose="020B0604020202020204" pitchFamily="34" charset="0"/>
@@ -14106,7 +14123,7 @@
           <a:lstStyle/>
           <a:p>
             <a:r>
-              <a:rPr lang="ru-RU" sz="1000" dirty="0">
+              <a:rPr lang="ru-RU" sz="1000" dirty="0" smtClean="0">
                 <a:solidFill>
                   <a:schemeClr val="bg1"/>
                 </a:solidFill>
@@ -14115,7 +14132,7 @@
               <a:t>Разработка гибридного </a:t>
             </a:r>
             <a:r>
-              <a:rPr lang="ru-RU" sz="1000" dirty="0" err="1">
+              <a:rPr lang="ru-RU" sz="1000" dirty="0" err="1" smtClean="0">
                 <a:solidFill>
                   <a:schemeClr val="bg1"/>
                 </a:solidFill>
@@ -14124,14 +14141,20 @@
               <a:t>фреймворка</a:t>
             </a:r>
             <a:r>
-              <a:rPr lang="ru-RU" sz="1000" dirty="0">
+              <a:rPr lang="ru-RU" sz="1000" dirty="0" smtClean="0">
                 <a:solidFill>
                   <a:schemeClr val="bg1"/>
                 </a:solidFill>
                 <a:latin typeface="Montserrat" pitchFamily="2" charset="0"/>
               </a:rPr>
-              <a:t> для автоматизации тестирования в крупных компаниях</a:t>
-            </a:r>
+              <a:t> для автоматизации тестирования приложений</a:t>
+            </a:r>
+            <a:endParaRPr lang="ru-RU" sz="1000" dirty="0">
+              <a:solidFill>
+                <a:schemeClr val="bg1"/>
+              </a:solidFill>
+              <a:latin typeface="Montserrat" pitchFamily="2" charset="0"/>
+            </a:endParaRPr>
           </a:p>
         </p:txBody>
       </p:sp>
@@ -14335,11 +14358,7 @@
             </a:pPr>
             <a:r>
               <a:rPr lang="ru-RU" sz="2000" dirty="0" smtClean="0"/>
-              <a:t>разработать </a:t>
-            </a:r>
-            <a:r>
-              <a:rPr lang="ru-RU" sz="2000" dirty="0" smtClean="0"/>
-              <a:t>шаблоны для </a:t>
+              <a:t>разработать шаблоны для </a:t>
             </a:r>
             <a:r>
               <a:rPr lang="ru-RU" sz="2000" dirty="0"/>
@@ -14544,7 +14563,7 @@
           <a:lstStyle/>
           <a:p>
             <a:r>
-              <a:rPr lang="ru-RU" sz="1000" dirty="0">
+              <a:rPr lang="ru-RU" sz="1000" dirty="0" smtClean="0">
                 <a:solidFill>
                   <a:schemeClr val="bg1"/>
                 </a:solidFill>
@@ -14553,7 +14572,7 @@
               <a:t>Разработка гибридного </a:t>
             </a:r>
             <a:r>
-              <a:rPr lang="ru-RU" sz="1000" dirty="0" err="1">
+              <a:rPr lang="ru-RU" sz="1000" dirty="0" err="1" smtClean="0">
                 <a:solidFill>
                   <a:schemeClr val="bg1"/>
                 </a:solidFill>
@@ -14562,14 +14581,20 @@
               <a:t>фреймворка</a:t>
             </a:r>
             <a:r>
-              <a:rPr lang="ru-RU" sz="1000" dirty="0">
+              <a:rPr lang="ru-RU" sz="1000" dirty="0" smtClean="0">
                 <a:solidFill>
                   <a:schemeClr val="bg1"/>
                 </a:solidFill>
                 <a:latin typeface="Montserrat" pitchFamily="2" charset="0"/>
               </a:rPr>
-              <a:t> для автоматизации тестирования в крупных компаниях</a:t>
-            </a:r>
+              <a:t> для автоматизации тестирования приложений</a:t>
+            </a:r>
+            <a:endParaRPr lang="ru-RU" sz="1000" dirty="0">
+              <a:solidFill>
+                <a:schemeClr val="bg1"/>
+              </a:solidFill>
+              <a:latin typeface="Montserrat" pitchFamily="2" charset="0"/>
+            </a:endParaRPr>
           </a:p>
         </p:txBody>
       </p:sp>
@@ -15057,7 +15082,7 @@
           <a:lstStyle/>
           <a:p>
             <a:r>
-              <a:rPr lang="ru-RU" sz="1000" dirty="0">
+              <a:rPr lang="ru-RU" sz="1000" dirty="0" smtClean="0">
                 <a:solidFill>
                   <a:schemeClr val="bg1"/>
                 </a:solidFill>
@@ -15066,7 +15091,7 @@
               <a:t>Разработка гибридного </a:t>
             </a:r>
             <a:r>
-              <a:rPr lang="ru-RU" sz="1000" dirty="0" err="1">
+              <a:rPr lang="ru-RU" sz="1000" dirty="0" err="1" smtClean="0">
                 <a:solidFill>
                   <a:schemeClr val="bg1"/>
                 </a:solidFill>
@@ -15075,14 +15100,20 @@
               <a:t>фреймворка</a:t>
             </a:r>
             <a:r>
-              <a:rPr lang="ru-RU" sz="1000" dirty="0">
+              <a:rPr lang="ru-RU" sz="1000" dirty="0" smtClean="0">
                 <a:solidFill>
                   <a:schemeClr val="bg1"/>
                 </a:solidFill>
                 <a:latin typeface="Montserrat" pitchFamily="2" charset="0"/>
               </a:rPr>
-              <a:t> для автоматизации тестирования в крупных компаниях</a:t>
-            </a:r>
+              <a:t> для автоматизации тестирования приложений</a:t>
+            </a:r>
+            <a:endParaRPr lang="ru-RU" sz="1000" dirty="0">
+              <a:solidFill>
+                <a:schemeClr val="bg1"/>
+              </a:solidFill>
+              <a:latin typeface="Montserrat" pitchFamily="2" charset="0"/>
+            </a:endParaRPr>
           </a:p>
         </p:txBody>
       </p:sp>
@@ -15425,7 +15456,7 @@
           <a:lstStyle/>
           <a:p>
             <a:r>
-              <a:rPr lang="ru-RU" sz="1000" dirty="0">
+              <a:rPr lang="ru-RU" sz="1000" dirty="0" smtClean="0">
                 <a:solidFill>
                   <a:schemeClr val="bg1"/>
                 </a:solidFill>
@@ -15434,7 +15465,7 @@
               <a:t>Разработка гибридного </a:t>
             </a:r>
             <a:r>
-              <a:rPr lang="ru-RU" sz="1000" dirty="0" err="1">
+              <a:rPr lang="ru-RU" sz="1000" dirty="0" err="1" smtClean="0">
                 <a:solidFill>
                   <a:schemeClr val="bg1"/>
                 </a:solidFill>
@@ -15443,14 +15474,20 @@
               <a:t>фреймворка</a:t>
             </a:r>
             <a:r>
-              <a:rPr lang="ru-RU" sz="1000" dirty="0">
+              <a:rPr lang="ru-RU" sz="1000" dirty="0" smtClean="0">
                 <a:solidFill>
                   <a:schemeClr val="bg1"/>
                 </a:solidFill>
                 <a:latin typeface="Montserrat" pitchFamily="2" charset="0"/>
               </a:rPr>
-              <a:t> для автоматизации тестирования в крупных компаниях</a:t>
-            </a:r>
+              <a:t> для автоматизации тестирования приложений</a:t>
+            </a:r>
+            <a:endParaRPr lang="ru-RU" sz="1000" dirty="0">
+              <a:solidFill>
+                <a:schemeClr val="bg1"/>
+              </a:solidFill>
+              <a:latin typeface="Montserrat" pitchFamily="2" charset="0"/>
+            </a:endParaRPr>
           </a:p>
         </p:txBody>
       </p:sp>
@@ -15795,7 +15832,7 @@
           <a:lstStyle/>
           <a:p>
             <a:r>
-              <a:rPr lang="ru-RU" sz="1000" dirty="0">
+              <a:rPr lang="ru-RU" sz="1000" dirty="0" smtClean="0">
                 <a:solidFill>
                   <a:schemeClr val="bg1"/>
                 </a:solidFill>
@@ -15804,7 +15841,7 @@
               <a:t>Разработка гибридного </a:t>
             </a:r>
             <a:r>
-              <a:rPr lang="ru-RU" sz="1000" dirty="0" err="1">
+              <a:rPr lang="ru-RU" sz="1000" dirty="0" err="1" smtClean="0">
                 <a:solidFill>
                   <a:schemeClr val="bg1"/>
                 </a:solidFill>
@@ -15813,14 +15850,20 @@
               <a:t>фреймворка</a:t>
             </a:r>
             <a:r>
-              <a:rPr lang="ru-RU" sz="1000" dirty="0">
+              <a:rPr lang="ru-RU" sz="1000" dirty="0" smtClean="0">
                 <a:solidFill>
                   <a:schemeClr val="bg1"/>
                 </a:solidFill>
                 <a:latin typeface="Montserrat" pitchFamily="2" charset="0"/>
               </a:rPr>
-              <a:t> для автоматизации тестирования в крупных компаниях</a:t>
-            </a:r>
+              <a:t> для автоматизации тестирования приложений</a:t>
+            </a:r>
+            <a:endParaRPr lang="ru-RU" sz="1000" dirty="0">
+              <a:solidFill>
+                <a:schemeClr val="bg1"/>
+              </a:solidFill>
+              <a:latin typeface="Montserrat" pitchFamily="2" charset="0"/>
+            </a:endParaRPr>
           </a:p>
         </p:txBody>
       </p:sp>
@@ -15966,11 +16009,7 @@
           <a:p>
             <a:r>
               <a:rPr lang="ru-RU" sz="2400" b="1" i="1" dirty="0" smtClean="0"/>
-              <a:t>Тестовый с</a:t>
-            </a:r>
-            <a:r>
-              <a:rPr lang="ru-RU" sz="2400" b="1" i="1" dirty="0" smtClean="0"/>
-              <a:t>ценарий </a:t>
+              <a:t>Тестовый сценарий </a:t>
             </a:r>
             <a:r>
               <a:rPr lang="ru-RU" sz="2400" dirty="0" smtClean="0"/>
@@ -16021,13 +16060,7 @@
               <a:rPr lang="ru-RU" sz="3200" dirty="0" smtClean="0">
                 <a:latin typeface="Montserrat" pitchFamily="2" charset="0"/>
               </a:rPr>
-              <a:t>Шаблоны для унификации </a:t>
-            </a:r>
-            <a:r>
-              <a:rPr lang="ru-RU" sz="3200" dirty="0" smtClean="0">
-                <a:latin typeface="Montserrat" pitchFamily="2" charset="0"/>
-              </a:rPr>
-              <a:t>формирования тестовых сценариев</a:t>
+              <a:t>Шаблоны для унификации формирования тестовых сценариев</a:t>
             </a:r>
             <a:endParaRPr lang="ru-RU" sz="3200" dirty="0">
               <a:latin typeface="Montserrat" pitchFamily="2" charset="0"/>
@@ -16224,7 +16257,7 @@
           <a:lstStyle/>
           <a:p>
             <a:r>
-              <a:rPr lang="ru-RU" sz="1000" dirty="0">
+              <a:rPr lang="ru-RU" sz="1000" dirty="0" smtClean="0">
                 <a:solidFill>
                   <a:schemeClr val="bg1"/>
                 </a:solidFill>
@@ -16233,7 +16266,7 @@
               <a:t>Разработка гибридного </a:t>
             </a:r>
             <a:r>
-              <a:rPr lang="ru-RU" sz="1000" dirty="0" err="1">
+              <a:rPr lang="ru-RU" sz="1000" dirty="0" err="1" smtClean="0">
                 <a:solidFill>
                   <a:schemeClr val="bg1"/>
                 </a:solidFill>
@@ -16242,14 +16275,20 @@
               <a:t>фреймворка</a:t>
             </a:r>
             <a:r>
-              <a:rPr lang="ru-RU" sz="1000" dirty="0">
+              <a:rPr lang="ru-RU" sz="1000" dirty="0" smtClean="0">
                 <a:solidFill>
                   <a:schemeClr val="bg1"/>
                 </a:solidFill>
                 <a:latin typeface="Montserrat" pitchFamily="2" charset="0"/>
               </a:rPr>
-              <a:t> для автоматизации тестирования в крупных компаниях</a:t>
-            </a:r>
+              <a:t> для автоматизации тестирования приложений</a:t>
+            </a:r>
+            <a:endParaRPr lang="ru-RU" sz="1000" dirty="0">
+              <a:solidFill>
+                <a:schemeClr val="bg1"/>
+              </a:solidFill>
+              <a:latin typeface="Montserrat" pitchFamily="2" charset="0"/>
+            </a:endParaRPr>
           </a:p>
         </p:txBody>
       </p:sp>
@@ -16399,9 +16438,6 @@
               </a:rPr>
               <a:t>Пример применения типовой модели автоматизированных тестов </a:t>
             </a:r>
-            <a:endParaRPr lang="ru-RU" sz="3200" dirty="0">
-              <a:latin typeface="Montserrat" pitchFamily="2" charset="0"/>
-            </a:endParaRPr>
           </a:p>
         </p:txBody>
       </p:sp>

</xml_diff>

<commit_message>
final final fucking fuck GOD DAMN!
</commit_message>
<xml_diff>
--- a/презентация.pptx
+++ b/презентация.pptx
@@ -224,7 +224,7 @@
           <a:p>
             <a:fld id="{EE4BEA0C-B298-4F3F-8EAA-78E653AF7C43}" type="datetimeFigureOut">
               <a:rPr lang="ru-RU" smtClean="0"/>
-              <a:t>06.06.2022</a:t>
+              <a:t>07.06.2022</a:t>
             </a:fld>
             <a:endParaRPr lang="ru-RU"/>
           </a:p>
@@ -389,7 +389,7 @@
           <a:p>
             <a:fld id="{56F03E67-5427-4260-B62A-5770CE0A55F7}" type="datetimeFigureOut">
               <a:rPr lang="ru-RU" smtClean="0"/>
-              <a:t>06.06.2022</a:t>
+              <a:t>07.06.2022</a:t>
             </a:fld>
             <a:endParaRPr lang="ru-RU"/>
           </a:p>
@@ -941,7 +941,7 @@
           <a:p>
             <a:fld id="{61BBDE8E-1A21-4D39-9CDA-17B1B51844FA}" type="datetimeFigureOut">
               <a:rPr lang="ru-RU" smtClean="0"/>
-              <a:t>06.06.2022</a:t>
+              <a:t>07.06.2022</a:t>
             </a:fld>
             <a:endParaRPr lang="ru-RU"/>
           </a:p>
@@ -1241,7 +1241,7 @@
           <a:p>
             <a:fld id="{61BBDE8E-1A21-4D39-9CDA-17B1B51844FA}" type="datetimeFigureOut">
               <a:rPr lang="ru-RU" smtClean="0"/>
-              <a:t>06.06.2022</a:t>
+              <a:t>07.06.2022</a:t>
             </a:fld>
             <a:endParaRPr lang="ru-RU"/>
           </a:p>
@@ -1501,7 +1501,7 @@
           <a:p>
             <a:fld id="{61BBDE8E-1A21-4D39-9CDA-17B1B51844FA}" type="datetimeFigureOut">
               <a:rPr lang="ru-RU" smtClean="0"/>
-              <a:t>06.06.2022</a:t>
+              <a:t>07.06.2022</a:t>
             </a:fld>
             <a:endParaRPr lang="ru-RU"/>
           </a:p>
@@ -2182,7 +2182,7 @@
           <a:p>
             <a:fld id="{61BBDE8E-1A21-4D39-9CDA-17B1B51844FA}" type="datetimeFigureOut">
               <a:rPr lang="ru-RU" smtClean="0"/>
-              <a:t>06.06.2022</a:t>
+              <a:t>07.06.2022</a:t>
             </a:fld>
             <a:endParaRPr lang="ru-RU"/>
           </a:p>
@@ -4516,7 +4516,7 @@
           <a:p>
             <a:fld id="{61BBDE8E-1A21-4D39-9CDA-17B1B51844FA}" type="datetimeFigureOut">
               <a:rPr lang="ru-RU" smtClean="0"/>
-              <a:t>06.06.2022</a:t>
+              <a:t>07.06.2022</a:t>
             </a:fld>
             <a:endParaRPr lang="ru-RU"/>
           </a:p>
@@ -4988,7 +4988,31 @@
                 <a:latin typeface="Montserrat" pitchFamily="2" charset="0"/>
                 <a:cs typeface="Arial" panose="020B0604020202020204" pitchFamily="34" charset="0"/>
               </a:rPr>
-              <a:t> для автоматизации тестирования приложений</a:t>
+              <a:t> для автоматизации тестирования </a:t>
+            </a:r>
+            <a:r>
+              <a:rPr lang="ru-RU" sz="2400" b="0" dirty="0" smtClean="0">
+                <a:solidFill>
+                  <a:schemeClr val="accent1">
+                    <a:lumMod val="50000"/>
+                  </a:schemeClr>
+                </a:solidFill>
+                <a:latin typeface="Montserrat" pitchFamily="2" charset="0"/>
+                <a:cs typeface="Arial" panose="020B0604020202020204" pitchFamily="34" charset="0"/>
+              </a:rPr>
+              <a:t>приложений</a:t>
+            </a:r>
+            <a:r>
+              <a:rPr lang="en-US" sz="2400" b="0" smtClean="0">
+                <a:solidFill>
+                  <a:schemeClr val="accent1">
+                    <a:lumMod val="50000"/>
+                  </a:schemeClr>
+                </a:solidFill>
+                <a:latin typeface="Montserrat" pitchFamily="2" charset="0"/>
+                <a:cs typeface="Arial" panose="020B0604020202020204" pitchFamily="34" charset="0"/>
+              </a:rPr>
+              <a:t> </a:t>
             </a:r>
             <a:endParaRPr lang="ru-RU" sz="2400" b="0" dirty="0">
               <a:latin typeface="Montserrat" pitchFamily="2" charset="0"/>

</xml_diff>